<commit_message>
Updates based reviews by 4
</commit_message>
<xml_diff>
--- a/RA-L Hetro Sensors/pictures/DronevsTime.pptx
+++ b/RA-L Hetro Sensors/pictures/DronevsTime.pptx
@@ -104,6 +104,11 @@
       </a:defRPr>
     </a:lvl9pPr>
   </p:defaultTextStyle>
+  <p:extLst>
+    <p:ext uri="{EFAFB233-063F-42B5-8137-9DF3F51BA10A}">
+      <p15:sldGuideLst xmlns:p15="http://schemas.microsoft.com/office/powerpoint/2012/main"/>
+    </p:ext>
+  </p:extLst>
 </p:presentation>
 </file>
 
@@ -238,7 +243,7 @@
           <a:p>
             <a:fld id="{42201F2A-60D3-4BBC-8527-452C50226E2F}" type="datetimeFigureOut">
               <a:rPr lang="en-US" smtClean="0"/>
-              <a:t>9/8/2016</a:t>
+              <a:t>9/10/2016</a:t>
             </a:fld>
             <a:endParaRPr lang="en-US"/>
           </a:p>
@@ -408,7 +413,7 @@
           <a:p>
             <a:fld id="{42201F2A-60D3-4BBC-8527-452C50226E2F}" type="datetimeFigureOut">
               <a:rPr lang="en-US" smtClean="0"/>
-              <a:t>9/8/2016</a:t>
+              <a:t>9/10/2016</a:t>
             </a:fld>
             <a:endParaRPr lang="en-US"/>
           </a:p>
@@ -588,7 +593,7 @@
           <a:p>
             <a:fld id="{42201F2A-60D3-4BBC-8527-452C50226E2F}" type="datetimeFigureOut">
               <a:rPr lang="en-US" smtClean="0"/>
-              <a:t>9/8/2016</a:t>
+              <a:t>9/10/2016</a:t>
             </a:fld>
             <a:endParaRPr lang="en-US"/>
           </a:p>
@@ -758,7 +763,7 @@
           <a:p>
             <a:fld id="{42201F2A-60D3-4BBC-8527-452C50226E2F}" type="datetimeFigureOut">
               <a:rPr lang="en-US" smtClean="0"/>
-              <a:t>9/8/2016</a:t>
+              <a:t>9/10/2016</a:t>
             </a:fld>
             <a:endParaRPr lang="en-US"/>
           </a:p>
@@ -1004,7 +1009,7 @@
           <a:p>
             <a:fld id="{42201F2A-60D3-4BBC-8527-452C50226E2F}" type="datetimeFigureOut">
               <a:rPr lang="en-US" smtClean="0"/>
-              <a:t>9/8/2016</a:t>
+              <a:t>9/10/2016</a:t>
             </a:fld>
             <a:endParaRPr lang="en-US"/>
           </a:p>
@@ -1236,7 +1241,7 @@
           <a:p>
             <a:fld id="{42201F2A-60D3-4BBC-8527-452C50226E2F}" type="datetimeFigureOut">
               <a:rPr lang="en-US" smtClean="0"/>
-              <a:t>9/8/2016</a:t>
+              <a:t>9/10/2016</a:t>
             </a:fld>
             <a:endParaRPr lang="en-US"/>
           </a:p>
@@ -1603,7 +1608,7 @@
           <a:p>
             <a:fld id="{42201F2A-60D3-4BBC-8527-452C50226E2F}" type="datetimeFigureOut">
               <a:rPr lang="en-US" smtClean="0"/>
-              <a:t>9/8/2016</a:t>
+              <a:t>9/10/2016</a:t>
             </a:fld>
             <a:endParaRPr lang="en-US"/>
           </a:p>
@@ -1721,7 +1726,7 @@
           <a:p>
             <a:fld id="{42201F2A-60D3-4BBC-8527-452C50226E2F}" type="datetimeFigureOut">
               <a:rPr lang="en-US" smtClean="0"/>
-              <a:t>9/8/2016</a:t>
+              <a:t>9/10/2016</a:t>
             </a:fld>
             <a:endParaRPr lang="en-US"/>
           </a:p>
@@ -1816,7 +1821,7 @@
           <a:p>
             <a:fld id="{42201F2A-60D3-4BBC-8527-452C50226E2F}" type="datetimeFigureOut">
               <a:rPr lang="en-US" smtClean="0"/>
-              <a:t>9/8/2016</a:t>
+              <a:t>9/10/2016</a:t>
             </a:fld>
             <a:endParaRPr lang="en-US"/>
           </a:p>
@@ -2093,7 +2098,7 @@
           <a:p>
             <a:fld id="{42201F2A-60D3-4BBC-8527-452C50226E2F}" type="datetimeFigureOut">
               <a:rPr lang="en-US" smtClean="0"/>
-              <a:t>9/8/2016</a:t>
+              <a:t>9/10/2016</a:t>
             </a:fld>
             <a:endParaRPr lang="en-US"/>
           </a:p>
@@ -2350,7 +2355,7 @@
           <a:p>
             <a:fld id="{42201F2A-60D3-4BBC-8527-452C50226E2F}" type="datetimeFigureOut">
               <a:rPr lang="en-US" smtClean="0"/>
-              <a:t>9/8/2016</a:t>
+              <a:t>9/10/2016</a:t>
             </a:fld>
             <a:endParaRPr lang="en-US"/>
           </a:p>
@@ -2563,7 +2568,7 @@
           <a:p>
             <a:fld id="{42201F2A-60D3-4BBC-8527-452C50226E2F}" type="datetimeFigureOut">
               <a:rPr lang="en-US" smtClean="0"/>
-              <a:t>9/8/2016</a:t>
+              <a:t>9/10/2016</a:t>
             </a:fld>
             <a:endParaRPr lang="en-US"/>
           </a:p>
@@ -2984,19 +2989,49 @@
               </a:ext>
             </a:extLst>
           </a:blip>
-          <a:srcRect l="8971" t="2218" r="7794"/>
+          <a:srcRect l="8971" t="2218" r="7794" b="5418"/>
           <a:stretch/>
         </p:blipFill>
         <p:spPr>
           <a:xfrm>
             <a:off x="-9412" y="0"/>
-            <a:ext cx="12201412" cy="6562166"/>
+            <a:ext cx="12201412" cy="6198577"/>
           </a:xfrm>
           <a:prstGeom prst="rect">
             <a:avLst/>
           </a:prstGeom>
         </p:spPr>
       </p:pic>
+      <p:sp>
+        <p:nvSpPr>
+          <p:cNvPr id="2" name="TextBox 1"/>
+          <p:cNvSpPr txBox="1"/>
+          <p:nvPr/>
+        </p:nvSpPr>
+        <p:spPr>
+          <a:xfrm>
+            <a:off x="5124090" y="6186135"/>
+            <a:ext cx="2449902" cy="461665"/>
+          </a:xfrm>
+          <a:prstGeom prst="rect">
+            <a:avLst/>
+          </a:prstGeom>
+          <a:noFill/>
+        </p:spPr>
+        <p:txBody>
+          <a:bodyPr wrap="square" rtlCol="0">
+            <a:spAutoFit/>
+          </a:bodyPr>
+          <a:lstStyle/>
+          <a:p>
+            <a:r>
+              <a:rPr lang="en-US" sz="2400" dirty="0" smtClean="0"/>
+              <a:t>Number of UAVs</a:t>
+            </a:r>
+            <a:endParaRPr lang="en-US" sz="2400" dirty="0"/>
+          </a:p>
+        </p:txBody>
+      </p:sp>
     </p:spTree>
     <p:extLst>
       <p:ext uri="{BB962C8B-B14F-4D97-AF65-F5344CB8AC3E}">

</xml_diff>